<commit_message>
Updated ppt with recorded audio
</commit_message>
<xml_diff>
--- a/Bull Market or Bear Market.pptx
+++ b/Bull Market or Bear Market.pptx
@@ -109,6 +109,11 @@
       </a:defRPr>
     </a:lvl9pPr>
   </p:defaultTextStyle>
+  <p:extLst>
+    <p:ext uri="{EFAFB233-063F-42B5-8137-9DF3F51BA10A}">
+      <p15:sldGuideLst xmlns:p15="http://schemas.microsoft.com/office/powerpoint/2012/main"/>
+    </p:ext>
+  </p:extLst>
 </p:presentation>
 </file>
 
@@ -505,23 +510,6 @@
           <a:bodyPr/>
           <a:lstStyle/>
           <a:p>
-            <a:pPr marL="0" marR="0" lvl="0" indent="0" algn="l" defTabSz="914400" rtl="0" eaLnBrk="1" fontAlgn="auto" latinLnBrk="0" hangingPunct="1">
-              <a:lnSpc>
-                <a:spcPct val="100000"/>
-              </a:lnSpc>
-              <a:spcBef>
-                <a:spcPts val="0"/>
-              </a:spcBef>
-              <a:spcAft>
-                <a:spcPts val="0"/>
-              </a:spcAft>
-              <a:buClrTx/>
-              <a:buSzTx/>
-              <a:buFontTx/>
-              <a:buNone/>
-              <a:tabLst/>
-              <a:defRPr/>
-            </a:pPr>
             <a:r>
               <a:rPr lang="en-US" sz="1200" b="1" kern="1200" dirty="0">
                 <a:solidFill>
@@ -532,10 +520,10 @@
                 <a:ea typeface="+mn-ea"/>
                 <a:cs typeface="+mn-cs"/>
               </a:rPr>
-              <a:t>In the fourth quarter of 2023, the US stock market is experiencing significant volatility. Objective is to analyze and understand the current environment across multiple dimensions in order to predict with sound data science principles where the US stock market will be by the end of the first quarter of 2024. Success criteria includes whether three-month prediction interval of S&amp;P 500 was within </a:t>
-            </a:r>
-            <a:r>
-              <a:rPr lang="en-US" sz="1200" b="1" kern="1200" dirty="0" err="1">
+              <a:t>Hello</a:t>
+            </a:r>
+            <a:r>
+              <a:rPr lang="en-US" sz="1200" kern="1200" dirty="0">
                 <a:solidFill>
                   <a:schemeClr val="tx1"/>
                 </a:solidFill>
@@ -544,10 +532,12 @@
                 <a:ea typeface="+mn-ea"/>
                 <a:cs typeface="+mn-cs"/>
               </a:rPr>
-              <a:t>within</a:t>
-            </a:r>
-            <a:r>
-              <a:rPr lang="en-US" sz="1200" b="1" kern="1200" dirty="0">
+              <a:t>. </a:t>
+            </a:r>
+          </a:p>
+          <a:p>
+            <a:r>
+              <a:rPr lang="en-US" sz="1200" kern="1200" dirty="0">
                 <a:solidFill>
                   <a:schemeClr val="tx1"/>
                 </a:solidFill>
@@ -556,57 +546,12 @@
                 <a:ea typeface="+mn-ea"/>
                 <a:cs typeface="+mn-cs"/>
               </a:rPr>
-              <a:t> a 90% confidence interval for at least 90% of periods and final price APE &lt; 10%.</a:t>
-            </a:r>
-          </a:p>
-          <a:p>
-            <a:pPr marL="0" marR="0" lvl="0" indent="0" algn="l" defTabSz="914400" rtl="0" eaLnBrk="1" fontAlgn="auto" latinLnBrk="0" hangingPunct="1">
-              <a:lnSpc>
-                <a:spcPct val="100000"/>
-              </a:lnSpc>
-              <a:spcBef>
-                <a:spcPts val="0"/>
-              </a:spcBef>
-              <a:spcAft>
-                <a:spcPts val="0"/>
-              </a:spcAft>
-              <a:buClrTx/>
-              <a:buSzTx/>
-              <a:buFontTx/>
-              <a:buNone/>
-              <a:tabLst/>
-              <a:defRPr/>
-            </a:pPr>
-            <a:endParaRPr lang="en-US" sz="1200" b="1" kern="1200" dirty="0">
-              <a:solidFill>
-                <a:schemeClr val="tx1"/>
-              </a:solidFill>
-              <a:effectLst/>
-              <a:latin typeface="+mn-lt"/>
-              <a:ea typeface="+mn-ea"/>
-              <a:cs typeface="+mn-cs"/>
-            </a:endParaRPr>
-          </a:p>
-          <a:p>
-            <a:pPr marL="0" marR="0" lvl="0" indent="0" algn="l" defTabSz="914400" rtl="0" eaLnBrk="1" fontAlgn="auto" latinLnBrk="0" hangingPunct="1">
-              <a:lnSpc>
-                <a:spcPct val="100000"/>
-              </a:lnSpc>
-              <a:spcBef>
-                <a:spcPts val="0"/>
-              </a:spcBef>
-              <a:spcAft>
-                <a:spcPts val="0"/>
-              </a:spcAft>
-              <a:buClrTx/>
-              <a:buSzTx/>
-              <a:buFontTx/>
-              <a:buNone/>
-              <a:tabLst/>
-              <a:defRPr/>
-            </a:pPr>
-            <a:r>
-              <a:rPr lang="en-US" sz="1200" b="1" kern="1200" dirty="0">
+              <a:t>We are team 1. John, Gabriella and myself, Ravita. </a:t>
+            </a:r>
+          </a:p>
+          <a:p>
+            <a:r>
+              <a:rPr lang="en-US" sz="1200" kern="1200" dirty="0">
                 <a:solidFill>
                   <a:schemeClr val="tx1"/>
                 </a:solidFill>
@@ -615,266 +560,8 @@
                 <a:ea typeface="+mn-ea"/>
                 <a:cs typeface="+mn-cs"/>
               </a:rPr>
-              <a:t>Background: </a:t>
-            </a:r>
-          </a:p>
-          <a:p>
-            <a:r>
-              <a:rPr lang="en-US" sz="1200" kern="1200" dirty="0">
-                <a:solidFill>
-                  <a:schemeClr val="tx1"/>
-                </a:solidFill>
-                <a:effectLst/>
-                <a:latin typeface="+mn-lt"/>
-                <a:ea typeface="+mn-ea"/>
-                <a:cs typeface="+mn-cs"/>
-              </a:rPr>
-              <a:t>As expected, this search trend was captured during the start of the great recession which was influenced by the housing market crash in 2008 (</a:t>
-            </a:r>
-            <a:r>
-              <a:rPr lang="en-US" sz="1200" kern="1200" dirty="0" err="1">
-                <a:solidFill>
-                  <a:schemeClr val="tx1"/>
-                </a:solidFill>
-                <a:effectLst/>
-                <a:latin typeface="+mn-lt"/>
-                <a:ea typeface="+mn-ea"/>
-                <a:cs typeface="+mn-cs"/>
-              </a:rPr>
-              <a:t>Hudomiet</a:t>
-            </a:r>
-            <a:r>
-              <a:rPr lang="en-US" sz="1200" kern="1200" dirty="0">
-                <a:solidFill>
-                  <a:schemeClr val="tx1"/>
-                </a:solidFill>
-                <a:effectLst/>
-                <a:latin typeface="+mn-lt"/>
-                <a:ea typeface="+mn-ea"/>
-                <a:cs typeface="+mn-cs"/>
-              </a:rPr>
-              <a:t> et. al., 2011). This was then followed by the most recent COVID-19 recession which was the second steep decline in economic activity in the last 15 years. </a:t>
-            </a:r>
-          </a:p>
-          <a:p>
-            <a:r>
-              <a:rPr lang="en-US" sz="1200" kern="1200" dirty="0">
-                <a:solidFill>
-                  <a:schemeClr val="tx1"/>
-                </a:solidFill>
-                <a:effectLst/>
-                <a:latin typeface="+mn-lt"/>
-                <a:ea typeface="+mn-ea"/>
-                <a:cs typeface="+mn-cs"/>
-              </a:rPr>
-              <a:t>            Since then, there has been notable literary data derived from 42 recessions in 14 countries using quarterly periods that have high potential for correctly forecasting the next recession (</a:t>
-            </a:r>
-            <a:r>
-              <a:rPr lang="en-US" sz="1200" kern="1200" dirty="0" err="1">
-                <a:solidFill>
-                  <a:schemeClr val="tx1"/>
-                </a:solidFill>
-                <a:effectLst/>
-                <a:latin typeface="+mn-lt"/>
-                <a:ea typeface="+mn-ea"/>
-                <a:cs typeface="+mn-cs"/>
-              </a:rPr>
-              <a:t>Kroencke</a:t>
-            </a:r>
-            <a:r>
-              <a:rPr lang="en-US" sz="1200" kern="1200" dirty="0">
-                <a:solidFill>
-                  <a:schemeClr val="tx1"/>
-                </a:solidFill>
-                <a:effectLst/>
-                <a:latin typeface="+mn-lt"/>
-                <a:ea typeface="+mn-ea"/>
-                <a:cs typeface="+mn-cs"/>
-              </a:rPr>
-              <a:t>, 2022). It is said that stock prices dropped significantly at about 30% at the start of recession while dividends fell on average by 13% </a:t>
-            </a:r>
-            <a:endParaRPr lang="en-US" sz="1200" b="1" kern="1200" dirty="0">
-              <a:solidFill>
-                <a:schemeClr val="tx1"/>
-              </a:solidFill>
-              <a:effectLst/>
-              <a:latin typeface="+mn-lt"/>
-              <a:ea typeface="+mn-ea"/>
-              <a:cs typeface="+mn-cs"/>
-            </a:endParaRPr>
-          </a:p>
-          <a:p>
-            <a:pPr marL="0" marR="0" lvl="0" indent="0" algn="l" defTabSz="914400" rtl="0" eaLnBrk="1" fontAlgn="auto" latinLnBrk="0" hangingPunct="1">
-              <a:lnSpc>
-                <a:spcPct val="100000"/>
-              </a:lnSpc>
-              <a:spcBef>
-                <a:spcPts val="0"/>
-              </a:spcBef>
-              <a:spcAft>
-                <a:spcPts val="0"/>
-              </a:spcAft>
-              <a:buClrTx/>
-              <a:buSzTx/>
-              <a:buFontTx/>
-              <a:buNone/>
-              <a:tabLst/>
-              <a:defRPr/>
-            </a:pPr>
-            <a:r>
-              <a:rPr lang="en-US" sz="1200" kern="1200" dirty="0">
-                <a:solidFill>
-                  <a:schemeClr val="tx1"/>
-                </a:solidFill>
-                <a:effectLst/>
-                <a:latin typeface="+mn-lt"/>
-                <a:ea typeface="+mn-ea"/>
-                <a:cs typeface="+mn-cs"/>
-              </a:rPr>
-              <a:t>The goal is to predict with sound data science principles where the US stock market will be by the end of the first quarter of 2024 to ultimately manage risk and build capital.</a:t>
-            </a:r>
-          </a:p>
-          <a:p>
-            <a:pPr marL="0" marR="0" lvl="0" indent="0" algn="l" defTabSz="914400" rtl="0" eaLnBrk="1" fontAlgn="auto" latinLnBrk="0" hangingPunct="1">
-              <a:lnSpc>
-                <a:spcPct val="100000"/>
-              </a:lnSpc>
-              <a:spcBef>
-                <a:spcPts val="0"/>
-              </a:spcBef>
-              <a:spcAft>
-                <a:spcPts val="0"/>
-              </a:spcAft>
-              <a:buClrTx/>
-              <a:buSzTx/>
-              <a:buFontTx/>
-              <a:buNone/>
-              <a:tabLst/>
-              <a:defRPr/>
-            </a:pPr>
-            <a:endParaRPr lang="en-US" sz="1200" kern="1200" dirty="0">
-              <a:solidFill>
-                <a:schemeClr val="tx1"/>
-              </a:solidFill>
-              <a:effectLst/>
-              <a:latin typeface="+mn-lt"/>
-              <a:ea typeface="+mn-ea"/>
-              <a:cs typeface="+mn-cs"/>
-            </a:endParaRPr>
-          </a:p>
-          <a:p>
-            <a:endParaRPr lang="en-US" sz="1200" b="1" kern="1200" dirty="0">
-              <a:solidFill>
-                <a:schemeClr val="tx1"/>
-              </a:solidFill>
-              <a:effectLst/>
-              <a:latin typeface="+mn-lt"/>
-              <a:ea typeface="+mn-ea"/>
-              <a:cs typeface="+mn-cs"/>
-            </a:endParaRPr>
-          </a:p>
-          <a:p>
-            <a:r>
-              <a:rPr lang="en-US" sz="1200" b="1" kern="1200" dirty="0">
-                <a:solidFill>
-                  <a:schemeClr val="tx1"/>
-                </a:solidFill>
-                <a:effectLst/>
-                <a:latin typeface="+mn-lt"/>
-                <a:ea typeface="+mn-ea"/>
-                <a:cs typeface="+mn-cs"/>
-              </a:rPr>
-              <a:t>Financial markets and their subsequent investment vehicles present significant opportunity to manage risk and build capital. Through deeper understanding of the underlying characteristics of the markets and these vehicles, we may be able to leverage our growing knowledge of time series analysis to decompose price movements by price level, price trend, quarterly seasonality, and noise. Furthermore, understanding what may influence these components further aims to strengthen our ability to perform time series price prediction to manage risk and build capital.</a:t>
-            </a:r>
-            <a:endParaRPr lang="en-US" sz="1200" kern="1200" dirty="0">
-              <a:solidFill>
-                <a:schemeClr val="tx1"/>
-              </a:solidFill>
-              <a:effectLst/>
-              <a:latin typeface="+mn-lt"/>
-              <a:ea typeface="+mn-ea"/>
-              <a:cs typeface="+mn-cs"/>
-            </a:endParaRPr>
-          </a:p>
-          <a:p>
-            <a:r>
-              <a:rPr lang="en-US" sz="1200" kern="1200" dirty="0">
-                <a:solidFill>
-                  <a:schemeClr val="tx1"/>
-                </a:solidFill>
-                <a:effectLst/>
-                <a:latin typeface="+mn-lt"/>
-                <a:ea typeface="+mn-ea"/>
-                <a:cs typeface="+mn-cs"/>
-              </a:rPr>
-              <a:t> </a:t>
-            </a:r>
-          </a:p>
-          <a:p>
-            <a:r>
-              <a:rPr lang="en-US" sz="1200" b="1" kern="1200" dirty="0">
-                <a:solidFill>
-                  <a:schemeClr val="tx1"/>
-                </a:solidFill>
-                <a:effectLst/>
-                <a:latin typeface="+mn-lt"/>
-                <a:ea typeface="+mn-ea"/>
-                <a:cs typeface="+mn-cs"/>
-              </a:rPr>
-              <a:t>Goal</a:t>
-            </a:r>
-            <a:r>
-              <a:rPr lang="en-US" sz="1200" kern="1200" dirty="0">
-                <a:solidFill>
-                  <a:schemeClr val="tx1"/>
-                </a:solidFill>
-                <a:effectLst/>
-                <a:latin typeface="+mn-lt"/>
-                <a:ea typeface="+mn-ea"/>
-                <a:cs typeface="+mn-cs"/>
-              </a:rPr>
-              <a:t>: </a:t>
-            </a:r>
-          </a:p>
-          <a:p>
-            <a:r>
-              <a:rPr lang="en-US" sz="1200" kern="1200" dirty="0">
-                <a:solidFill>
-                  <a:schemeClr val="tx1"/>
-                </a:solidFill>
-                <a:effectLst/>
-                <a:latin typeface="+mn-lt"/>
-                <a:ea typeface="+mn-ea"/>
-                <a:cs typeface="+mn-cs"/>
-              </a:rPr>
-              <a:t>Fluctuations of the market often occurred on a short-term basis. </a:t>
-            </a:r>
-          </a:p>
-          <a:p>
-            <a:r>
-              <a:rPr lang="en-US" sz="1200" b="1" kern="1200" dirty="0">
-                <a:solidFill>
-                  <a:schemeClr val="tx1"/>
-                </a:solidFill>
-                <a:effectLst/>
-                <a:latin typeface="+mn-lt"/>
-                <a:ea typeface="+mn-ea"/>
-                <a:cs typeface="+mn-cs"/>
-              </a:rPr>
-              <a:t> </a:t>
-            </a:r>
-            <a:endParaRPr lang="en-US" sz="1200" kern="1200" dirty="0">
-              <a:solidFill>
-                <a:schemeClr val="tx1"/>
-              </a:solidFill>
-              <a:effectLst/>
-              <a:latin typeface="+mn-lt"/>
-              <a:ea typeface="+mn-ea"/>
-              <a:cs typeface="+mn-cs"/>
-            </a:endParaRPr>
-          </a:p>
-          <a:p>
-            <a:endParaRPr lang="en-US" dirty="0"/>
+              <a:t>We want to invite you to explore stock price market prediction in the first quarter of 2024. Would it be bull or bear market? </a:t>
+            </a:r>
           </a:p>
         </p:txBody>
       </p:sp>
@@ -895,7 +582,7 @@
           <a:p>
             <a:fld id="{8729BEAF-0406-4E8F-ABDF-7F337C4A00DF}" type="slidenum">
               <a:rPr lang="en-US" smtClean="0"/>
-              <a:t>2</a:t>
+              <a:t>1</a:t>
             </a:fld>
             <a:endParaRPr lang="en-US"/>
           </a:p>
@@ -904,7 +591,7 @@
     </p:spTree>
     <p:extLst>
       <p:ext uri="{BB962C8B-B14F-4D97-AF65-F5344CB8AC3E}">
-        <p14:creationId xmlns:p14="http://schemas.microsoft.com/office/powerpoint/2010/main" val="1976978863"/>
+        <p14:creationId xmlns:p14="http://schemas.microsoft.com/office/powerpoint/2010/main" val="3624788101"/>
       </p:ext>
     </p:extLst>
   </p:cSld>
@@ -958,6 +645,23 @@
           <a:bodyPr/>
           <a:lstStyle/>
           <a:p>
+            <a:pPr marL="0" marR="0" lvl="0" indent="0" algn="l" defTabSz="914400" rtl="0" eaLnBrk="1" fontAlgn="auto" latinLnBrk="0" hangingPunct="1">
+              <a:lnSpc>
+                <a:spcPct val="100000"/>
+              </a:lnSpc>
+              <a:spcBef>
+                <a:spcPts val="0"/>
+              </a:spcBef>
+              <a:spcAft>
+                <a:spcPts val="0"/>
+              </a:spcAft>
+              <a:buClrTx/>
+              <a:buSzTx/>
+              <a:buFontTx/>
+              <a:buNone/>
+              <a:tabLst/>
+              <a:defRPr/>
+            </a:pPr>
             <a:r>
               <a:rPr lang="en-US" sz="1200" b="1" kern="1200" dirty="0">
                 <a:solidFill>
@@ -968,10 +672,12 @@
                 <a:ea typeface="+mn-ea"/>
                 <a:cs typeface="+mn-cs"/>
               </a:rPr>
-              <a:t>Dataset is live financial market data sourced from Yahoo Finance using the Python application programming interface, </a:t>
-            </a:r>
-            <a:r>
-              <a:rPr lang="en-US" sz="1200" b="1" kern="1200" dirty="0" err="1">
+              <a:t>Situation: </a:t>
+            </a:r>
+          </a:p>
+          <a:p>
+            <a:r>
+              <a:rPr lang="en-US" sz="1200" kern="1200" dirty="0">
                 <a:solidFill>
                   <a:schemeClr val="tx1"/>
                 </a:solidFill>
@@ -980,10 +686,12 @@
                 <a:ea typeface="+mn-ea"/>
                 <a:cs typeface="+mn-cs"/>
               </a:rPr>
-              <a:t>yfinance</a:t>
-            </a:r>
-            <a:r>
-              <a:rPr lang="en-US" sz="1200" b="1" kern="1200" dirty="0">
+              <a:t>The stock market is experiencing fluctuations with unpredictable movements, creating a state of uncertainty. </a:t>
+            </a:r>
+          </a:p>
+          <a:p>
+            <a:r>
+              <a:rPr lang="en-US" sz="1200" kern="1200" dirty="0">
                 <a:solidFill>
                   <a:schemeClr val="tx1"/>
                 </a:solidFill>
@@ -992,8 +700,289 @@
                 <a:ea typeface="+mn-ea"/>
                 <a:cs typeface="+mn-cs"/>
               </a:rPr>
-              <a:t> to pull/scrape live data. Interface is licensed under Apache Software License as of submission.</a:t>
-            </a:r>
+              <a:t>In the fourth quarter of 2023, the US stock market is experiencing significant a prolong downturn and instability. Financial markets and their subsequent investment vehicles present significant opportunity to manage risk and build capital. </a:t>
+            </a:r>
+          </a:p>
+          <a:p>
+            <a:r>
+              <a:rPr lang="en-US" sz="1200" kern="1200" dirty="0">
+                <a:solidFill>
+                  <a:schemeClr val="tx1"/>
+                </a:solidFill>
+                <a:effectLst/>
+                <a:latin typeface="+mn-lt"/>
+                <a:ea typeface="+mn-ea"/>
+                <a:cs typeface="+mn-cs"/>
+              </a:rPr>
+              <a:t>Through deeper understanding of the underlying characteristics of the markets and these vehicles, we may be able to leverage our growing knowledge in price movements of its level, trend, seasonality, and others factors which may influence the price movement throughout periods of time.</a:t>
+            </a:r>
+          </a:p>
+          <a:p>
+            <a:pPr marL="0" marR="0" lvl="0" indent="0" algn="l" defTabSz="914400" rtl="0" eaLnBrk="1" fontAlgn="auto" latinLnBrk="0" hangingPunct="1">
+              <a:lnSpc>
+                <a:spcPct val="100000"/>
+              </a:lnSpc>
+              <a:spcBef>
+                <a:spcPts val="0"/>
+              </a:spcBef>
+              <a:spcAft>
+                <a:spcPts val="0"/>
+              </a:spcAft>
+              <a:buClrTx/>
+              <a:buSzTx/>
+              <a:buFontTx/>
+              <a:buNone/>
+              <a:tabLst/>
+              <a:defRPr/>
+            </a:pPr>
+            <a:endParaRPr lang="en-US" sz="1200" b="0" kern="1200" dirty="0">
+              <a:solidFill>
+                <a:schemeClr val="tx1"/>
+              </a:solidFill>
+              <a:effectLst/>
+              <a:latin typeface="+mn-lt"/>
+              <a:ea typeface="+mn-ea"/>
+              <a:cs typeface="+mn-cs"/>
+            </a:endParaRPr>
+          </a:p>
+          <a:p>
+            <a:pPr marL="0" marR="0" lvl="0" indent="0" algn="l" defTabSz="914400" rtl="0" eaLnBrk="1" fontAlgn="auto" latinLnBrk="0" hangingPunct="1">
+              <a:lnSpc>
+                <a:spcPct val="100000"/>
+              </a:lnSpc>
+              <a:spcBef>
+                <a:spcPts val="0"/>
+              </a:spcBef>
+              <a:spcAft>
+                <a:spcPts val="0"/>
+              </a:spcAft>
+              <a:buClrTx/>
+              <a:buSzTx/>
+              <a:buFontTx/>
+              <a:buNone/>
+              <a:tabLst/>
+              <a:defRPr/>
+            </a:pPr>
+            <a:r>
+              <a:rPr lang="en-US" sz="1200" b="1" kern="1200" dirty="0">
+                <a:solidFill>
+                  <a:schemeClr val="tx1"/>
+                </a:solidFill>
+                <a:effectLst/>
+                <a:latin typeface="+mn-lt"/>
+                <a:ea typeface="+mn-ea"/>
+                <a:cs typeface="+mn-cs"/>
+              </a:rPr>
+              <a:t>Goal:</a:t>
+            </a:r>
+          </a:p>
+          <a:p>
+            <a:pPr marL="0" marR="0" lvl="0" indent="0" algn="l" defTabSz="914400" rtl="0" eaLnBrk="1" fontAlgn="auto" latinLnBrk="0" hangingPunct="1">
+              <a:lnSpc>
+                <a:spcPct val="100000"/>
+              </a:lnSpc>
+              <a:spcBef>
+                <a:spcPts val="0"/>
+              </a:spcBef>
+              <a:spcAft>
+                <a:spcPts val="0"/>
+              </a:spcAft>
+              <a:buClrTx/>
+              <a:buSzTx/>
+              <a:buFontTx/>
+              <a:buNone/>
+              <a:tabLst/>
+              <a:defRPr/>
+            </a:pPr>
+            <a:r>
+              <a:rPr lang="en-US" sz="1200" b="0" kern="1200" dirty="0">
+                <a:solidFill>
+                  <a:schemeClr val="tx1"/>
+                </a:solidFill>
+                <a:effectLst/>
+                <a:latin typeface="+mn-lt"/>
+                <a:ea typeface="+mn-ea"/>
+                <a:cs typeface="+mn-cs"/>
+              </a:rPr>
+              <a:t>The goal is to predict </a:t>
+            </a:r>
+            <a:r>
+              <a:rPr lang="en-US" sz="1200" kern="1200" dirty="0">
+                <a:solidFill>
+                  <a:schemeClr val="tx1"/>
+                </a:solidFill>
+                <a:effectLst/>
+                <a:latin typeface="+mn-lt"/>
+                <a:ea typeface="+mn-ea"/>
+                <a:cs typeface="+mn-cs"/>
+              </a:rPr>
+              <a:t>with sound data science principles where the US stock market will be by the end of the first quarter of 2024 </a:t>
+            </a:r>
+            <a:r>
+              <a:rPr lang="en-US" sz="1200" b="0" kern="1200" dirty="0">
+                <a:solidFill>
+                  <a:schemeClr val="tx1"/>
+                </a:solidFill>
+                <a:effectLst/>
+                <a:latin typeface="+mn-lt"/>
+                <a:ea typeface="+mn-ea"/>
+                <a:cs typeface="+mn-cs"/>
+              </a:rPr>
+              <a:t>and further to strengthen our ability to perform time series price prediction to manage risk and build capital. Using data and model, we aim to find an edge of providing investors to make a better investment decision. </a:t>
+            </a:r>
+          </a:p>
+          <a:p>
+            <a:pPr marL="0" marR="0" lvl="0" indent="0" algn="l" defTabSz="914400" rtl="0" eaLnBrk="1" fontAlgn="auto" latinLnBrk="0" hangingPunct="1">
+              <a:lnSpc>
+                <a:spcPct val="100000"/>
+              </a:lnSpc>
+              <a:spcBef>
+                <a:spcPts val="0"/>
+              </a:spcBef>
+              <a:spcAft>
+                <a:spcPts val="0"/>
+              </a:spcAft>
+              <a:buClrTx/>
+              <a:buSzTx/>
+              <a:buFontTx/>
+              <a:buNone/>
+              <a:tabLst/>
+              <a:defRPr/>
+            </a:pPr>
+            <a:endParaRPr lang="en-US" sz="1200" b="0" kern="1200" dirty="0">
+              <a:solidFill>
+                <a:schemeClr val="tx1"/>
+              </a:solidFill>
+              <a:effectLst/>
+              <a:latin typeface="+mn-lt"/>
+              <a:ea typeface="+mn-ea"/>
+              <a:cs typeface="+mn-cs"/>
+            </a:endParaRPr>
+          </a:p>
+          <a:p>
+            <a:pPr marL="0" marR="0" lvl="0" indent="0" algn="l" defTabSz="914400" rtl="0" eaLnBrk="1" fontAlgn="auto" latinLnBrk="0" hangingPunct="1">
+              <a:lnSpc>
+                <a:spcPct val="100000"/>
+              </a:lnSpc>
+              <a:spcBef>
+                <a:spcPts val="0"/>
+              </a:spcBef>
+              <a:spcAft>
+                <a:spcPts val="0"/>
+              </a:spcAft>
+              <a:buClrTx/>
+              <a:buSzTx/>
+              <a:buFontTx/>
+              <a:buNone/>
+              <a:tabLst/>
+              <a:defRPr/>
+            </a:pPr>
+            <a:r>
+              <a:rPr lang="en-US" sz="1200" b="1" kern="1200" dirty="0">
+                <a:solidFill>
+                  <a:schemeClr val="tx1"/>
+                </a:solidFill>
+                <a:effectLst/>
+                <a:latin typeface="+mn-lt"/>
+                <a:ea typeface="+mn-ea"/>
+                <a:cs typeface="+mn-cs"/>
+              </a:rPr>
+              <a:t>Approach:</a:t>
+            </a:r>
+          </a:p>
+          <a:p>
+            <a:r>
+              <a:rPr lang="en-US" sz="1200" b="0" i="0" kern="1200" dirty="0">
+                <a:solidFill>
+                  <a:schemeClr val="tx1"/>
+                </a:solidFill>
+                <a:effectLst/>
+                <a:latin typeface="+mn-lt"/>
+                <a:ea typeface="+mn-ea"/>
+                <a:cs typeface="+mn-cs"/>
+              </a:rPr>
+              <a:t>Basically, we will explore a two-pronged approach to accomplish the business objective</a:t>
+            </a:r>
+          </a:p>
+          <a:p>
+            <a:pPr marL="171450" indent="-171450">
+              <a:buFont typeface="Arial" panose="020B0604020202020204" pitchFamily="34" charset="0"/>
+              <a:buChar char="•"/>
+            </a:pPr>
+            <a:r>
+              <a:rPr lang="en-US" sz="1200" b="0" i="0" kern="1200" dirty="0">
+                <a:solidFill>
+                  <a:schemeClr val="tx1"/>
+                </a:solidFill>
+                <a:effectLst/>
+                <a:latin typeface="+mn-lt"/>
+                <a:ea typeface="+mn-ea"/>
+                <a:cs typeface="+mn-cs"/>
+              </a:rPr>
+              <a:t>Find a model or method that can predict prices accurately in the future</a:t>
+            </a:r>
+          </a:p>
+          <a:p>
+            <a:pPr marL="171450" indent="-171450">
+              <a:buFont typeface="Arial" panose="020B0604020202020204" pitchFamily="34" charset="0"/>
+              <a:buChar char="•"/>
+            </a:pPr>
+            <a:r>
+              <a:rPr lang="en-US" sz="1200" b="0" i="0" kern="1200" dirty="0">
+                <a:solidFill>
+                  <a:schemeClr val="tx1"/>
+                </a:solidFill>
+                <a:effectLst/>
+                <a:latin typeface="+mn-lt"/>
+                <a:ea typeface="+mn-ea"/>
+                <a:cs typeface="+mn-cs"/>
+              </a:rPr>
+              <a:t>Find a model or method that can predict what influences the stock market to go up</a:t>
+            </a:r>
+          </a:p>
+          <a:p>
+            <a:br>
+              <a:rPr lang="en-US" sz="1200" b="0" i="0" kern="1200" dirty="0">
+                <a:solidFill>
+                  <a:schemeClr val="tx1"/>
+                </a:solidFill>
+                <a:effectLst/>
+                <a:latin typeface="+mn-lt"/>
+                <a:ea typeface="+mn-ea"/>
+                <a:cs typeface="+mn-cs"/>
+              </a:rPr>
+            </a:br>
+            <a:r>
+              <a:rPr lang="en-US" sz="1200" b="0" i="0" kern="1200" dirty="0">
+                <a:solidFill>
+                  <a:schemeClr val="tx1"/>
+                </a:solidFill>
+                <a:effectLst/>
+                <a:latin typeface="+mn-lt"/>
+                <a:ea typeface="+mn-ea"/>
+                <a:cs typeface="+mn-cs"/>
+              </a:rPr>
+              <a:t>	</a:t>
+            </a:r>
+          </a:p>
+          <a:p>
+            <a:pPr marL="0" marR="0" lvl="0" indent="0" algn="l" defTabSz="914400" rtl="0" eaLnBrk="1" fontAlgn="auto" latinLnBrk="0" hangingPunct="1">
+              <a:lnSpc>
+                <a:spcPct val="100000"/>
+              </a:lnSpc>
+              <a:spcBef>
+                <a:spcPts val="0"/>
+              </a:spcBef>
+              <a:spcAft>
+                <a:spcPts val="0"/>
+              </a:spcAft>
+              <a:buClrTx/>
+              <a:buSzTx/>
+              <a:buFontTx/>
+              <a:buNone/>
+              <a:tabLst/>
+              <a:defRPr/>
+            </a:pPr>
             <a:endParaRPr lang="en-US" sz="1200" kern="1200" dirty="0">
               <a:solidFill>
                 <a:schemeClr val="tx1"/>
@@ -1006,7 +995,7 @@
           </a:p>
           <a:p>
             <a:r>
-              <a:rPr lang="en-US" sz="1200" kern="1200" dirty="0">
+              <a:rPr lang="en-US" sz="1200" b="1" kern="1200" dirty="0">
                 <a:solidFill>
                   <a:schemeClr val="tx1"/>
                 </a:solidFill>
@@ -1017,7 +1006,100 @@
               </a:rPr>
               <a:t> </a:t>
             </a:r>
-          </a:p>
+            <a:endParaRPr lang="en-US" sz="1200" kern="1200" dirty="0">
+              <a:solidFill>
+                <a:schemeClr val="tx1"/>
+              </a:solidFill>
+              <a:effectLst/>
+              <a:latin typeface="+mn-lt"/>
+              <a:ea typeface="+mn-ea"/>
+              <a:cs typeface="+mn-cs"/>
+            </a:endParaRPr>
+          </a:p>
+          <a:p>
+            <a:endParaRPr lang="en-US" dirty="0"/>
+          </a:p>
+        </p:txBody>
+      </p:sp>
+      <p:sp>
+        <p:nvSpPr>
+          <p:cNvPr id="4" name="Slide Number Placeholder 3"/>
+          <p:cNvSpPr>
+            <a:spLocks noGrp="1"/>
+          </p:cNvSpPr>
+          <p:nvPr>
+            <p:ph type="sldNum" sz="quarter" idx="5"/>
+          </p:nvPr>
+        </p:nvSpPr>
+        <p:spPr/>
+        <p:txBody>
+          <a:bodyPr/>
+          <a:lstStyle/>
+          <a:p>
+            <a:fld id="{8729BEAF-0406-4E8F-ABDF-7F337C4A00DF}" type="slidenum">
+              <a:rPr lang="en-US" smtClean="0"/>
+              <a:t>2</a:t>
+            </a:fld>
+            <a:endParaRPr lang="en-US"/>
+          </a:p>
+        </p:txBody>
+      </p:sp>
+    </p:spTree>
+    <p:extLst>
+      <p:ext uri="{BB962C8B-B14F-4D97-AF65-F5344CB8AC3E}">
+        <p14:creationId xmlns:p14="http://schemas.microsoft.com/office/powerpoint/2010/main" val="1976978863"/>
+      </p:ext>
+    </p:extLst>
+  </p:cSld>
+  <p:clrMapOvr>
+    <a:masterClrMapping/>
+  </p:clrMapOvr>
+</p:notes>
+</file>
+
+<file path=ppt/notesSlides/notesSlide3.xml><?xml version="1.0" encoding="utf-8"?>
+<p:notes xmlns:a="http://schemas.openxmlformats.org/drawingml/2006/main" xmlns:r="http://schemas.openxmlformats.org/officeDocument/2006/relationships" xmlns:p="http://schemas.openxmlformats.org/presentationml/2006/main">
+  <p:cSld>
+    <p:spTree>
+      <p:nvGrpSpPr>
+        <p:cNvPr id="1" name=""/>
+        <p:cNvGrpSpPr/>
+        <p:nvPr/>
+      </p:nvGrpSpPr>
+      <p:grpSpPr>
+        <a:xfrm>
+          <a:off x="0" y="0"/>
+          <a:ext cx="0" cy="0"/>
+          <a:chOff x="0" y="0"/>
+          <a:chExt cx="0" cy="0"/>
+        </a:xfrm>
+      </p:grpSpPr>
+      <p:sp>
+        <p:nvSpPr>
+          <p:cNvPr id="2" name="Slide Image Placeholder 1"/>
+          <p:cNvSpPr>
+            <a:spLocks noGrp="1" noRot="1" noChangeAspect="1"/>
+          </p:cNvSpPr>
+          <p:nvPr>
+            <p:ph type="sldImg"/>
+          </p:nvPr>
+        </p:nvSpPr>
+        <p:spPr/>
+      </p:sp>
+      <p:sp>
+        <p:nvSpPr>
+          <p:cNvPr id="3" name="Notes Placeholder 2"/>
+          <p:cNvSpPr>
+            <a:spLocks noGrp="1"/>
+          </p:cNvSpPr>
+          <p:nvPr>
+            <p:ph type="body" idx="1"/>
+          </p:nvPr>
+        </p:nvSpPr>
+        <p:spPr/>
+        <p:txBody>
+          <a:bodyPr/>
+          <a:lstStyle/>
           <a:p>
             <a:r>
               <a:rPr lang="en-US" sz="1200" kern="1200" dirty="0">
@@ -1029,7 +1111,7 @@
                 <a:ea typeface="+mn-ea"/>
                 <a:cs typeface="+mn-cs"/>
               </a:rPr>
-              <a:t> </a:t>
+              <a:t>Dataset is live financial market data sourced from Yahoo Finance with an extensive set of modules, attributes, and methods available to be utilized. We focus on 2 tickers which are SPY (S&amp;P 500 ETF) and AMZN with 5 years periods.</a:t>
             </a:r>
           </a:p>
           <a:p>
@@ -1043,10 +1125,23 @@
                 <a:ea typeface="+mn-ea"/>
                 <a:cs typeface="+mn-cs"/>
               </a:rPr>
-              <a:t>Data source, number of variables, size of dataset, </a:t>
-            </a:r>
-            <a:r>
-              <a:rPr lang="en-US" sz="1200" kern="1200" dirty="0" err="1">
+              <a:t>As we can see SPY price movement in 2023 shows trend and seasonality. </a:t>
+            </a:r>
+          </a:p>
+          <a:p>
+            <a:endParaRPr lang="en-US" sz="1200" kern="1200" dirty="0">
+              <a:solidFill>
+                <a:schemeClr val="tx1"/>
+              </a:solidFill>
+              <a:effectLst/>
+              <a:latin typeface="+mn-lt"/>
+              <a:ea typeface="+mn-ea"/>
+              <a:cs typeface="+mn-cs"/>
+            </a:endParaRPr>
+          </a:p>
+          <a:p>
+            <a:r>
+              <a:rPr lang="en-US" sz="1200" kern="1200" dirty="0">
                 <a:solidFill>
                   <a:schemeClr val="tx1"/>
                 </a:solidFill>
@@ -1055,49 +1150,8 @@
                 <a:ea typeface="+mn-ea"/>
                 <a:cs typeface="+mn-cs"/>
               </a:rPr>
-              <a:t>etc</a:t>
-            </a:r>
-            <a:r>
-              <a:rPr lang="en-US" sz="1200" kern="1200" dirty="0">
-                <a:solidFill>
-                  <a:schemeClr val="tx1"/>
-                </a:solidFill>
-                <a:effectLst/>
-                <a:latin typeface="+mn-lt"/>
-                <a:ea typeface="+mn-ea"/>
-                <a:cs typeface="+mn-cs"/>
-              </a:rPr>
-              <a:t>: </a:t>
-            </a:r>
-          </a:p>
-          <a:p>
-            <a:r>
-              <a:rPr lang="en-US" sz="1200" kern="1200" dirty="0">
-                <a:solidFill>
-                  <a:schemeClr val="tx1"/>
-                </a:solidFill>
-                <a:effectLst/>
-                <a:latin typeface="+mn-lt"/>
-                <a:ea typeface="+mn-ea"/>
-                <a:cs typeface="+mn-cs"/>
-              </a:rPr>
-              <a:t> </a:t>
-            </a:r>
-          </a:p>
-          <a:p>
-            <a:r>
-              <a:rPr lang="en-US" sz="1200" b="1" kern="1200" dirty="0">
-                <a:solidFill>
-                  <a:schemeClr val="tx1"/>
-                </a:solidFill>
-                <a:effectLst/>
-                <a:latin typeface="+mn-lt"/>
-                <a:ea typeface="+mn-ea"/>
-                <a:cs typeface="+mn-cs"/>
-              </a:rPr>
-              <a:t>Data is sourced from Yahoo Finance with an extensive set of modules, attributes, and methods available to be utilized in Python. There are at least 14 callable methods with at least 20 attributes or original variables. Size of the dataset is not applicable due to the source consisting of live data</a:t>
-            </a:r>
-            <a:endParaRPr lang="en-US" dirty="0"/>
+              <a:t>Gabriella will lead us to explore the data further. </a:t>
+            </a:r>
           </a:p>
         </p:txBody>
       </p:sp>
@@ -5027,6 +5081,44 @@
           </a:p>
         </p:txBody>
       </p:sp>
+      <p:pic>
+        <p:nvPicPr>
+          <p:cNvPr id="8" name="Audio 7">
+            <a:hlinkClick r:id="" action="ppaction://media"/>
+            <a:extLst>
+              <a:ext uri="{FF2B5EF4-FFF2-40B4-BE49-F238E27FC236}">
+                <a16:creationId xmlns:a16="http://schemas.microsoft.com/office/drawing/2014/main" id="{5D931EDB-312A-4DB7-A3EE-56FBD418FFF9}"/>
+              </a:ext>
+            </a:extLst>
+          </p:cNvPr>
+          <p:cNvPicPr>
+            <a:picLocks noChangeAspect="1"/>
+          </p:cNvPicPr>
+          <p:nvPr>
+            <a:audioFile r:link="rId2"/>
+            <p:extLst>
+              <p:ext uri="{DAA4B4D4-6D71-4841-9C94-3DE7FCFB9230}">
+                <p14:media xmlns:p14="http://schemas.microsoft.com/office/powerpoint/2010/main" r:embed="rId1"/>
+              </p:ext>
+            </p:extLst>
+          </p:nvPr>
+        </p:nvPicPr>
+        <p:blipFill>
+          <a:blip r:embed="rId5"/>
+          <a:stretch>
+            <a:fillRect/>
+          </a:stretch>
+        </p:blipFill>
+        <p:spPr>
+          <a:xfrm>
+            <a:off x="11430000" y="6096000"/>
+            <a:ext cx="609600" cy="609600"/>
+          </a:xfrm>
+          <a:prstGeom prst="rect">
+            <a:avLst/>
+          </a:prstGeom>
+        </p:spPr>
+      </p:pic>
     </p:spTree>
     <p:extLst>
       <p:ext uri="{BB962C8B-B14F-4D97-AF65-F5344CB8AC3E}">
@@ -5037,6 +5129,101 @@
   <p:clrMapOvr>
     <a:masterClrMapping/>
   </p:clrMapOvr>
+  <mc:AlternateContent xmlns:mc="http://schemas.openxmlformats.org/markup-compatibility/2006">
+    <mc:Choice xmlns:p14="http://schemas.microsoft.com/office/powerpoint/2010/main" Requires="p14">
+      <p:transition spd="slow" p14:dur="2000" advTm="22519"/>
+    </mc:Choice>
+    <mc:Fallback>
+      <p:transition spd="slow" advTm="22519"/>
+    </mc:Fallback>
+  </mc:AlternateContent>
+  <p:timing>
+    <p:tnLst>
+      <p:par>
+        <p:cTn id="1" dur="indefinite" restart="never" nodeType="tmRoot">
+          <p:childTnLst>
+            <p:seq concurrent="1" nextAc="seek">
+              <p:cTn id="2" dur="indefinite" nodeType="mainSeq">
+                <p:childTnLst>
+                  <p:par>
+                    <p:cTn id="3" fill="hold">
+                      <p:stCondLst>
+                        <p:cond delay="indefinite"/>
+                        <p:cond evt="onBegin" delay="0">
+                          <p:tn val="2"/>
+                        </p:cond>
+                      </p:stCondLst>
+                      <p:childTnLst>
+                        <p:par>
+                          <p:cTn id="4" fill="hold">
+                            <p:stCondLst>
+                              <p:cond delay="0"/>
+                            </p:stCondLst>
+                            <p:childTnLst>
+                              <p:par>
+                                <p:cTn id="5" presetID="1" presetClass="mediacall" presetSubtype="0" fill="hold" nodeType="afterEffect">
+                                  <p:stCondLst>
+                                    <p:cond delay="0"/>
+                                  </p:stCondLst>
+                                  <p:childTnLst>
+                                    <p:cmd type="call" cmd="playFrom(0.0)">
+                                      <p:cBhvr>
+                                        <p:cTn id="6" dur="1" fill="hold"/>
+                                        <p:tgtEl>
+                                          <p:spTgt spid="8"/>
+                                        </p:tgtEl>
+                                      </p:cBhvr>
+                                    </p:cmd>
+                                  </p:childTnLst>
+                                </p:cTn>
+                              </p:par>
+                            </p:childTnLst>
+                          </p:cTn>
+                        </p:par>
+                      </p:childTnLst>
+                    </p:cTn>
+                  </p:par>
+                </p:childTnLst>
+              </p:cTn>
+              <p:prevCondLst>
+                <p:cond evt="onPrev" delay="0">
+                  <p:tgtEl>
+                    <p:sldTgt/>
+                  </p:tgtEl>
+                </p:cond>
+              </p:prevCondLst>
+              <p:nextCondLst>
+                <p:cond evt="onNext" delay="0">
+                  <p:tgtEl>
+                    <p:sldTgt/>
+                  </p:tgtEl>
+                </p:cond>
+              </p:nextCondLst>
+            </p:seq>
+            <p:audio isNarration="1">
+              <p:cMediaNode vol="80000" showWhenStopped="0">
+                <p:cTn id="7" fill="hold" display="0">
+                  <p:stCondLst>
+                    <p:cond delay="indefinite"/>
+                  </p:stCondLst>
+                  <p:endCondLst>
+                    <p:cond evt="onStopAudio" delay="0">
+                      <p:tgtEl>
+                        <p:sldTgt/>
+                      </p:tgtEl>
+                    </p:cond>
+                  </p:endCondLst>
+                </p:cTn>
+                <p:tgtEl>
+                  <p:spTgt spid="8"/>
+                </p:tgtEl>
+              </p:cMediaNode>
+            </p:audio>
+          </p:childTnLst>
+        </p:cTn>
+      </p:par>
+    </p:tnLst>
+  </p:timing>
 </p:sld>
 </file>
 
@@ -5104,7 +5291,7 @@
         <p:spPr/>
         <p:txBody>
           <a:bodyPr>
-            <a:normAutofit/>
+            <a:normAutofit fontScale="85000" lnSpcReduction="20000"/>
           </a:bodyPr>
           <a:lstStyle/>
           <a:p>
@@ -5119,7 +5306,7 @@
           <a:p>
             <a:r>
               <a:rPr lang="en-US" dirty="0"/>
-              <a:t>A prolonged downturn in economic activity</a:t>
+              <a:t>A prolonged downturn in financial market</a:t>
             </a:r>
           </a:p>
           <a:p>
@@ -5149,23 +5336,75 @@
           <a:p>
             <a:r>
               <a:rPr lang="en-US" dirty="0"/>
-              <a:t>To predict which direction stock market will go by end of the first quarter of 2024. </a:t>
-            </a:r>
-          </a:p>
-          <a:p>
+              <a:t>To be able to inform investors to make better investments, and we aim to use time series analysis to find ways to find those "better ways“</a:t>
+            </a:r>
+          </a:p>
+          <a:p>
+            <a:pPr lvl="1"/>
             <a:r>
               <a:rPr lang="en-US" dirty="0"/>
-              <a:t>Success criteria : 75 – 80% accuracy </a:t>
-            </a:r>
-          </a:p>
-          <a:p>
-            <a:endParaRPr lang="en-US" dirty="0"/>
-          </a:p>
-          <a:p>
-            <a:endParaRPr lang="en-US" dirty="0"/>
-          </a:p>
-        </p:txBody>
-      </p:sp>
+              <a:t>Find a model or method that can predict prices accurately in the future</a:t>
+            </a:r>
+          </a:p>
+          <a:p>
+            <a:pPr lvl="1"/>
+            <a:r>
+              <a:rPr lang="en-US" dirty="0"/>
+              <a:t>Find a model or method that can predict what influences the stock market price direction</a:t>
+            </a:r>
+          </a:p>
+          <a:p>
+            <a:pPr marL="0" indent="0">
+              <a:buNone/>
+            </a:pPr>
+            <a:endParaRPr lang="en-US" dirty="0"/>
+          </a:p>
+          <a:p>
+            <a:r>
+              <a:rPr lang="en-US" dirty="0"/>
+              <a:t>Success criteria : +/- 20% prediction error</a:t>
+            </a:r>
+          </a:p>
+        </p:txBody>
+      </p:sp>
+      <p:pic>
+        <p:nvPicPr>
+          <p:cNvPr id="7" name="Audio 6">
+            <a:hlinkClick r:id="" action="ppaction://media"/>
+            <a:extLst>
+              <a:ext uri="{FF2B5EF4-FFF2-40B4-BE49-F238E27FC236}">
+                <a16:creationId xmlns:a16="http://schemas.microsoft.com/office/drawing/2014/main" id="{71F96DE8-31B1-48F4-B38E-55D216218BAD}"/>
+              </a:ext>
+            </a:extLst>
+          </p:cNvPr>
+          <p:cNvPicPr>
+            <a:picLocks noChangeAspect="1"/>
+          </p:cNvPicPr>
+          <p:nvPr>
+            <a:audioFile r:link="rId2"/>
+            <p:extLst>
+              <p:ext uri="{DAA4B4D4-6D71-4841-9C94-3DE7FCFB9230}">
+                <p14:media xmlns:p14="http://schemas.microsoft.com/office/powerpoint/2010/main" r:embed="rId1"/>
+              </p:ext>
+            </p:extLst>
+          </p:nvPr>
+        </p:nvPicPr>
+        <p:blipFill>
+          <a:blip r:embed="rId5"/>
+          <a:stretch>
+            <a:fillRect/>
+          </a:stretch>
+        </p:blipFill>
+        <p:spPr>
+          <a:xfrm>
+            <a:off x="11430000" y="6096000"/>
+            <a:ext cx="609600" cy="609600"/>
+          </a:xfrm>
+          <a:prstGeom prst="rect">
+            <a:avLst/>
+          </a:prstGeom>
+        </p:spPr>
+      </p:pic>
     </p:spTree>
     <p:extLst>
       <p:ext uri="{BB962C8B-B14F-4D97-AF65-F5344CB8AC3E}">
@@ -5176,6 +5415,101 @@
   <p:clrMapOvr>
     <a:masterClrMapping/>
   </p:clrMapOvr>
+  <mc:AlternateContent xmlns:mc="http://schemas.openxmlformats.org/markup-compatibility/2006">
+    <mc:Choice xmlns:p14="http://schemas.microsoft.com/office/powerpoint/2010/main" Requires="p14">
+      <p:transition spd="slow" p14:dur="2000" advTm="95426"/>
+    </mc:Choice>
+    <mc:Fallback>
+      <p:transition spd="slow" advTm="95426"/>
+    </mc:Fallback>
+  </mc:AlternateContent>
+  <p:timing>
+    <p:tnLst>
+      <p:par>
+        <p:cTn id="1" dur="indefinite" restart="never" nodeType="tmRoot">
+          <p:childTnLst>
+            <p:seq concurrent="1" nextAc="seek">
+              <p:cTn id="2" dur="indefinite" nodeType="mainSeq">
+                <p:childTnLst>
+                  <p:par>
+                    <p:cTn id="3" fill="hold">
+                      <p:stCondLst>
+                        <p:cond delay="indefinite"/>
+                        <p:cond evt="onBegin" delay="0">
+                          <p:tn val="2"/>
+                        </p:cond>
+                      </p:stCondLst>
+                      <p:childTnLst>
+                        <p:par>
+                          <p:cTn id="4" fill="hold">
+                            <p:stCondLst>
+                              <p:cond delay="0"/>
+                            </p:stCondLst>
+                            <p:childTnLst>
+                              <p:par>
+                                <p:cTn id="5" presetID="1" presetClass="mediacall" presetSubtype="0" fill="hold" nodeType="afterEffect">
+                                  <p:stCondLst>
+                                    <p:cond delay="0"/>
+                                  </p:stCondLst>
+                                  <p:childTnLst>
+                                    <p:cmd type="call" cmd="playFrom(0.0)">
+                                      <p:cBhvr>
+                                        <p:cTn id="6" dur="1" fill="hold"/>
+                                        <p:tgtEl>
+                                          <p:spTgt spid="7"/>
+                                        </p:tgtEl>
+                                      </p:cBhvr>
+                                    </p:cmd>
+                                  </p:childTnLst>
+                                </p:cTn>
+                              </p:par>
+                            </p:childTnLst>
+                          </p:cTn>
+                        </p:par>
+                      </p:childTnLst>
+                    </p:cTn>
+                  </p:par>
+                </p:childTnLst>
+              </p:cTn>
+              <p:prevCondLst>
+                <p:cond evt="onPrev" delay="0">
+                  <p:tgtEl>
+                    <p:sldTgt/>
+                  </p:tgtEl>
+                </p:cond>
+              </p:prevCondLst>
+              <p:nextCondLst>
+                <p:cond evt="onNext" delay="0">
+                  <p:tgtEl>
+                    <p:sldTgt/>
+                  </p:tgtEl>
+                </p:cond>
+              </p:nextCondLst>
+            </p:seq>
+            <p:audio isNarration="1">
+              <p:cMediaNode vol="80000" showWhenStopped="0">
+                <p:cTn id="7" fill="hold" display="0">
+                  <p:stCondLst>
+                    <p:cond delay="indefinite"/>
+                  </p:stCondLst>
+                  <p:endCondLst>
+                    <p:cond evt="onStopAudio" delay="0">
+                      <p:tgtEl>
+                        <p:sldTgt/>
+                      </p:tgtEl>
+                    </p:cond>
+                  </p:endCondLst>
+                </p:cTn>
+                <p:tgtEl>
+                  <p:spTgt spid="7"/>
+                </p:tgtEl>
+              </p:cMediaNode>
+            </p:audio>
+          </p:childTnLst>
+        </p:cTn>
+      </p:par>
+    </p:tnLst>
+  </p:timing>
 </p:sld>
 </file>
 
@@ -5307,6 +5641,74 @@
           </a:p>
         </p:txBody>
       </p:sp>
+      <p:pic>
+        <p:nvPicPr>
+          <p:cNvPr id="4" name="Picture 3">
+            <a:extLst>
+              <a:ext uri="{FF2B5EF4-FFF2-40B4-BE49-F238E27FC236}">
+                <a16:creationId xmlns:a16="http://schemas.microsoft.com/office/drawing/2014/main" id="{3FDC2EFC-BDB4-4277-94B4-E721BC514E71}"/>
+              </a:ext>
+            </a:extLst>
+          </p:cNvPr>
+          <p:cNvPicPr>
+            <a:picLocks noChangeAspect="1"/>
+          </p:cNvPicPr>
+          <p:nvPr/>
+        </p:nvPicPr>
+        <p:blipFill>
+          <a:blip r:embed="rId5"/>
+          <a:stretch>
+            <a:fillRect/>
+          </a:stretch>
+        </p:blipFill>
+        <p:spPr>
+          <a:xfrm>
+            <a:off x="6095999" y="2303536"/>
+            <a:ext cx="5436510" cy="3078352"/>
+          </a:xfrm>
+          <a:prstGeom prst="rect">
+            <a:avLst/>
+          </a:prstGeom>
+        </p:spPr>
+      </p:pic>
+      <p:pic>
+        <p:nvPicPr>
+          <p:cNvPr id="7" name="Audio 6">
+            <a:hlinkClick r:id="" action="ppaction://media"/>
+            <a:extLst>
+              <a:ext uri="{FF2B5EF4-FFF2-40B4-BE49-F238E27FC236}">
+                <a16:creationId xmlns:a16="http://schemas.microsoft.com/office/drawing/2014/main" id="{80D32062-3791-4463-9A72-C319B9F9C4A1}"/>
+              </a:ext>
+            </a:extLst>
+          </p:cNvPr>
+          <p:cNvPicPr>
+            <a:picLocks noChangeAspect="1"/>
+          </p:cNvPicPr>
+          <p:nvPr>
+            <a:audioFile r:link="rId2"/>
+            <p:extLst>
+              <p:ext uri="{DAA4B4D4-6D71-4841-9C94-3DE7FCFB9230}">
+                <p14:media xmlns:p14="http://schemas.microsoft.com/office/powerpoint/2010/main" r:embed="rId1"/>
+              </p:ext>
+            </p:extLst>
+          </p:nvPr>
+        </p:nvPicPr>
+        <p:blipFill>
+          <a:blip r:embed="rId6"/>
+          <a:stretch>
+            <a:fillRect/>
+          </a:stretch>
+        </p:blipFill>
+        <p:spPr>
+          <a:xfrm>
+            <a:off x="11430000" y="6096000"/>
+            <a:ext cx="609600" cy="609600"/>
+          </a:xfrm>
+          <a:prstGeom prst="rect">
+            <a:avLst/>
+          </a:prstGeom>
+        </p:spPr>
+      </p:pic>
     </p:spTree>
     <p:extLst>
       <p:ext uri="{BB962C8B-B14F-4D97-AF65-F5344CB8AC3E}">
@@ -5317,6 +5719,101 @@
   <p:clrMapOvr>
     <a:masterClrMapping/>
   </p:clrMapOvr>
+  <mc:AlternateContent xmlns:mc="http://schemas.openxmlformats.org/markup-compatibility/2006">
+    <mc:Choice xmlns:p14="http://schemas.microsoft.com/office/powerpoint/2010/main" Requires="p14">
+      <p:transition spd="slow" p14:dur="2000" advTm="45260"/>
+    </mc:Choice>
+    <mc:Fallback>
+      <p:transition spd="slow" advTm="45260"/>
+    </mc:Fallback>
+  </mc:AlternateContent>
+  <p:timing>
+    <p:tnLst>
+      <p:par>
+        <p:cTn id="1" dur="indefinite" restart="never" nodeType="tmRoot">
+          <p:childTnLst>
+            <p:seq concurrent="1" nextAc="seek">
+              <p:cTn id="2" dur="indefinite" nodeType="mainSeq">
+                <p:childTnLst>
+                  <p:par>
+                    <p:cTn id="3" fill="hold">
+                      <p:stCondLst>
+                        <p:cond delay="indefinite"/>
+                        <p:cond evt="onBegin" delay="0">
+                          <p:tn val="2"/>
+                        </p:cond>
+                      </p:stCondLst>
+                      <p:childTnLst>
+                        <p:par>
+                          <p:cTn id="4" fill="hold">
+                            <p:stCondLst>
+                              <p:cond delay="0"/>
+                            </p:stCondLst>
+                            <p:childTnLst>
+                              <p:par>
+                                <p:cTn id="5" presetID="1" presetClass="mediacall" presetSubtype="0" fill="hold" nodeType="afterEffect">
+                                  <p:stCondLst>
+                                    <p:cond delay="0"/>
+                                  </p:stCondLst>
+                                  <p:childTnLst>
+                                    <p:cmd type="call" cmd="playFrom(0.0)">
+                                      <p:cBhvr>
+                                        <p:cTn id="6" dur="1" fill="hold"/>
+                                        <p:tgtEl>
+                                          <p:spTgt spid="7"/>
+                                        </p:tgtEl>
+                                      </p:cBhvr>
+                                    </p:cmd>
+                                  </p:childTnLst>
+                                </p:cTn>
+                              </p:par>
+                            </p:childTnLst>
+                          </p:cTn>
+                        </p:par>
+                      </p:childTnLst>
+                    </p:cTn>
+                  </p:par>
+                </p:childTnLst>
+              </p:cTn>
+              <p:prevCondLst>
+                <p:cond evt="onPrev" delay="0">
+                  <p:tgtEl>
+                    <p:sldTgt/>
+                  </p:tgtEl>
+                </p:cond>
+              </p:prevCondLst>
+              <p:nextCondLst>
+                <p:cond evt="onNext" delay="0">
+                  <p:tgtEl>
+                    <p:sldTgt/>
+                  </p:tgtEl>
+                </p:cond>
+              </p:nextCondLst>
+            </p:seq>
+            <p:audio isNarration="1">
+              <p:cMediaNode vol="80000" showWhenStopped="0">
+                <p:cTn id="7" fill="hold" display="0">
+                  <p:stCondLst>
+                    <p:cond delay="indefinite"/>
+                  </p:stCondLst>
+                  <p:endCondLst>
+                    <p:cond evt="onStopAudio" delay="0">
+                      <p:tgtEl>
+                        <p:sldTgt/>
+                      </p:tgtEl>
+                    </p:cond>
+                  </p:endCondLst>
+                </p:cTn>
+                <p:tgtEl>
+                  <p:spTgt spid="7"/>
+                </p:tgtEl>
+              </p:cMediaNode>
+            </p:audio>
+          </p:childTnLst>
+        </p:cTn>
+      </p:par>
+    </p:tnLst>
+  </p:timing>
 </p:sld>
 </file>
 

</xml_diff>

<commit_message>
ppt and small changes on plots for notebook
</commit_message>
<xml_diff>
--- a/Bull Market or Bear Market.pptx
+++ b/Bull Market or Bear Market.pptx
@@ -5,12 +5,16 @@
     <p:sldMasterId id="2147483648" r:id="rId1"/>
   </p:sldMasterIdLst>
   <p:notesMasterIdLst>
-    <p:notesMasterId r:id="rId5"/>
+    <p:notesMasterId r:id="rId9"/>
   </p:notesMasterIdLst>
   <p:sldIdLst>
     <p:sldId id="256" r:id="rId2"/>
     <p:sldId id="257" r:id="rId3"/>
     <p:sldId id="258" r:id="rId4"/>
+    <p:sldId id="262" r:id="rId5"/>
+    <p:sldId id="263" r:id="rId6"/>
+    <p:sldId id="260" r:id="rId7"/>
+    <p:sldId id="261" r:id="rId8"/>
   </p:sldIdLst>
   <p:sldSz cx="12192000" cy="6858000"/>
   <p:notesSz cx="6858000" cy="9144000"/>
@@ -109,6 +113,11 @@
       </a:defRPr>
     </a:lvl9pPr>
   </p:defaultTextStyle>
+  <p:extLst>
+    <p:ext uri="{EFAFB233-063F-42B5-8137-9DF3F51BA10A}">
+      <p15:sldGuideLst xmlns:p15="http://schemas.microsoft.com/office/powerpoint/2012/main"/>
+    </p:ext>
+  </p:extLst>
 </p:presentation>
 </file>
 
@@ -194,7 +203,7 @@
           <a:p>
             <a:fld id="{518A2888-CB70-4764-886E-975AC8DD84DD}" type="datetimeFigureOut">
               <a:rPr lang="en-US" smtClean="0"/>
-              <a:t>11/30/2023</a:t>
+              <a:t>12/1/23</a:t>
             </a:fld>
             <a:endParaRPr lang="en-US"/>
           </a:p>
@@ -1383,7 +1392,7 @@
             <a:fld id="{B61BEF0D-F0BB-DE4B-95CE-6DB70DBA9567}" type="datetimeFigureOut">
               <a:rPr lang="en-US" dirty="0"/>
               <a:pPr/>
-              <a:t>11/30/2023</a:t>
+              <a:t>12/1/23</a:t>
             </a:fld>
             <a:endParaRPr lang="en-US" dirty="0"/>
           </a:p>
@@ -1642,7 +1651,7 @@
             <a:fld id="{B61BEF0D-F0BB-DE4B-95CE-6DB70DBA9567}" type="datetimeFigureOut">
               <a:rPr lang="en-US" dirty="0"/>
               <a:pPr/>
-              <a:t>11/30/2023</a:t>
+              <a:t>12/1/23</a:t>
             </a:fld>
             <a:endParaRPr lang="en-US" dirty="0"/>
           </a:p>
@@ -1874,7 +1883,7 @@
             <a:fld id="{B61BEF0D-F0BB-DE4B-95CE-6DB70DBA9567}" type="datetimeFigureOut">
               <a:rPr lang="en-US" dirty="0"/>
               <a:pPr/>
-              <a:t>11/30/2023</a:t>
+              <a:t>12/1/23</a:t>
             </a:fld>
             <a:endParaRPr lang="en-US" dirty="0"/>
           </a:p>
@@ -2111,7 +2120,7 @@
             <a:fld id="{B61BEF0D-F0BB-DE4B-95CE-6DB70DBA9567}" type="datetimeFigureOut">
               <a:rPr lang="en-US" dirty="0"/>
               <a:pPr/>
-              <a:t>11/30/2023</a:t>
+              <a:t>12/1/23</a:t>
             </a:fld>
             <a:endParaRPr lang="en-US" dirty="0"/>
           </a:p>
@@ -2415,7 +2424,7 @@
             <a:fld id="{B61BEF0D-F0BB-DE4B-95CE-6DB70DBA9567}" type="datetimeFigureOut">
               <a:rPr lang="en-US" dirty="0"/>
               <a:pPr/>
-              <a:t>11/30/2023</a:t>
+              <a:t>12/1/23</a:t>
             </a:fld>
             <a:endParaRPr lang="en-US" dirty="0"/>
           </a:p>
@@ -2714,7 +2723,7 @@
             <a:fld id="{B61BEF0D-F0BB-DE4B-95CE-6DB70DBA9567}" type="datetimeFigureOut">
               <a:rPr lang="en-US" dirty="0"/>
               <a:pPr/>
-              <a:t>11/30/2023</a:t>
+              <a:t>12/1/23</a:t>
             </a:fld>
             <a:endParaRPr lang="en-US" dirty="0"/>
           </a:p>
@@ -3133,7 +3142,7 @@
             <a:fld id="{B61BEF0D-F0BB-DE4B-95CE-6DB70DBA9567}" type="datetimeFigureOut">
               <a:rPr lang="en-US" dirty="0"/>
               <a:pPr/>
-              <a:t>11/30/2023</a:t>
+              <a:t>12/1/23</a:t>
             </a:fld>
             <a:endParaRPr lang="en-US" dirty="0"/>
           </a:p>
@@ -3292,7 +3301,7 @@
             <a:fld id="{B61BEF0D-F0BB-DE4B-95CE-6DB70DBA9567}" type="datetimeFigureOut">
               <a:rPr lang="en-US" dirty="0"/>
               <a:pPr/>
-              <a:t>11/30/2023</a:t>
+              <a:t>12/1/23</a:t>
             </a:fld>
             <a:endParaRPr lang="en-US" dirty="0"/>
           </a:p>
@@ -3384,7 +3393,7 @@
             <a:fld id="{B61BEF0D-F0BB-DE4B-95CE-6DB70DBA9567}" type="datetimeFigureOut">
               <a:rPr lang="en-US" dirty="0"/>
               <a:pPr/>
-              <a:t>11/30/2023</a:t>
+              <a:t>12/1/23</a:t>
             </a:fld>
             <a:endParaRPr lang="en-US" dirty="0"/>
           </a:p>
@@ -3759,7 +3768,7 @@
             <a:fld id="{B61BEF0D-F0BB-DE4B-95CE-6DB70DBA9567}" type="datetimeFigureOut">
               <a:rPr lang="en-US" dirty="0"/>
               <a:pPr/>
-              <a:t>11/30/2023</a:t>
+              <a:t>12/1/23</a:t>
             </a:fld>
             <a:endParaRPr lang="en-US" dirty="0"/>
           </a:p>
@@ -4045,7 +4054,7 @@
             <a:fld id="{B61BEF0D-F0BB-DE4B-95CE-6DB70DBA9567}" type="datetimeFigureOut">
               <a:rPr lang="en-US" dirty="0"/>
               <a:pPr/>
-              <a:t>11/30/2023</a:t>
+              <a:t>12/1/23</a:t>
             </a:fld>
             <a:endParaRPr lang="en-US" dirty="0"/>
           </a:p>
@@ -4253,7 +4262,7 @@
             <a:fld id="{B61BEF0D-F0BB-DE4B-95CE-6DB70DBA9567}" type="datetimeFigureOut">
               <a:rPr lang="en-US" dirty="0"/>
               <a:pPr/>
-              <a:t>11/30/2023</a:t>
+              <a:t>12/1/23</a:t>
             </a:fld>
             <a:endParaRPr lang="en-US" dirty="0"/>
           </a:p>
@@ -5311,6 +5320,668 @@
     <p:extLst>
       <p:ext uri="{BB962C8B-B14F-4D97-AF65-F5344CB8AC3E}">
         <p14:creationId xmlns:p14="http://schemas.microsoft.com/office/powerpoint/2010/main" val="3805560146"/>
+      </p:ext>
+    </p:extLst>
+  </p:cSld>
+  <p:clrMapOvr>
+    <a:masterClrMapping/>
+  </p:clrMapOvr>
+</p:sld>
+</file>
+
+<file path=ppt/slides/slide4.xml><?xml version="1.0" encoding="utf-8"?>
+<p:sld xmlns:a="http://schemas.openxmlformats.org/drawingml/2006/main" xmlns:r="http://schemas.openxmlformats.org/officeDocument/2006/relationships" xmlns:p="http://schemas.openxmlformats.org/presentationml/2006/main">
+  <p:cSld>
+    <p:spTree>
+      <p:nvGrpSpPr>
+        <p:cNvPr id="1" name=""/>
+        <p:cNvGrpSpPr/>
+        <p:nvPr/>
+      </p:nvGrpSpPr>
+      <p:grpSpPr>
+        <a:xfrm>
+          <a:off x="0" y="0"/>
+          <a:ext cx="0" cy="0"/>
+          <a:chOff x="0" y="0"/>
+          <a:chExt cx="0" cy="0"/>
+        </a:xfrm>
+      </p:grpSpPr>
+      <p:sp>
+        <p:nvSpPr>
+          <p:cNvPr id="2" name="Title 1">
+            <a:extLst>
+              <a:ext uri="{FF2B5EF4-FFF2-40B4-BE49-F238E27FC236}">
+                <a16:creationId xmlns:a16="http://schemas.microsoft.com/office/drawing/2014/main" id="{9B6B83D1-416D-1070-0FA3-699191033F38}"/>
+              </a:ext>
+            </a:extLst>
+          </p:cNvPr>
+          <p:cNvSpPr>
+            <a:spLocks noGrp="1"/>
+          </p:cNvSpPr>
+          <p:nvPr>
+            <p:ph type="title"/>
+          </p:nvPr>
+        </p:nvSpPr>
+        <p:spPr/>
+        <p:txBody>
+          <a:bodyPr/>
+          <a:lstStyle/>
+          <a:p>
+            <a:r>
+              <a:rPr lang="en-US" dirty="0"/>
+              <a:t>EDA: SPY500 Closing stock prices</a:t>
+            </a:r>
+          </a:p>
+        </p:txBody>
+      </p:sp>
+      <p:pic>
+        <p:nvPicPr>
+          <p:cNvPr id="7" name="Content Placeholder 6">
+            <a:extLst>
+              <a:ext uri="{FF2B5EF4-FFF2-40B4-BE49-F238E27FC236}">
+                <a16:creationId xmlns:a16="http://schemas.microsoft.com/office/drawing/2014/main" id="{CC7676EB-4717-3E6E-E65A-3DEAAB8015B4}"/>
+              </a:ext>
+            </a:extLst>
+          </p:cNvPr>
+          <p:cNvPicPr>
+            <a:picLocks noGrp="1" noChangeAspect="1"/>
+          </p:cNvPicPr>
+          <p:nvPr>
+            <p:ph sz="half" idx="2"/>
+          </p:nvPr>
+        </p:nvPicPr>
+        <p:blipFill>
+          <a:blip r:embed="rId2"/>
+          <a:stretch>
+            <a:fillRect/>
+          </a:stretch>
+        </p:blipFill>
+        <p:spPr>
+          <a:xfrm>
+            <a:off x="6188077" y="2105276"/>
+            <a:ext cx="5456030" cy="4023066"/>
+          </a:xfrm>
+          <a:prstGeom prst="rect">
+            <a:avLst/>
+          </a:prstGeom>
+          <a:ln>
+            <a:noFill/>
+          </a:ln>
+          <a:effectLst>
+            <a:outerShdw blurRad="292100" dist="139700" dir="2700000" algn="tl" rotWithShape="0">
+              <a:srgbClr val="333333">
+                <a:alpha val="65000"/>
+              </a:srgbClr>
+            </a:outerShdw>
+          </a:effectLst>
+        </p:spPr>
+      </p:pic>
+      <p:pic>
+        <p:nvPicPr>
+          <p:cNvPr id="10" name="Content Placeholder 9">
+            <a:extLst>
+              <a:ext uri="{FF2B5EF4-FFF2-40B4-BE49-F238E27FC236}">
+                <a16:creationId xmlns:a16="http://schemas.microsoft.com/office/drawing/2014/main" id="{E4FCC305-8E3D-2C47-7741-087B90EA55C5}"/>
+              </a:ext>
+            </a:extLst>
+          </p:cNvPr>
+          <p:cNvPicPr>
+            <a:picLocks noGrp="1" noChangeAspect="1"/>
+          </p:cNvPicPr>
+          <p:nvPr>
+            <p:ph sz="half" idx="1"/>
+          </p:nvPr>
+        </p:nvPicPr>
+        <p:blipFill>
+          <a:blip r:embed="rId3"/>
+          <a:stretch>
+            <a:fillRect/>
+          </a:stretch>
+        </p:blipFill>
+        <p:spPr>
+          <a:xfrm>
+            <a:off x="581025" y="2585204"/>
+            <a:ext cx="5422900" cy="2917905"/>
+          </a:xfrm>
+          <a:prstGeom prst="rect">
+            <a:avLst/>
+          </a:prstGeom>
+          <a:ln>
+            <a:noFill/>
+          </a:ln>
+          <a:effectLst>
+            <a:outerShdw blurRad="292100" dist="139700" dir="2700000" algn="tl" rotWithShape="0">
+              <a:srgbClr val="333333">
+                <a:alpha val="65000"/>
+              </a:srgbClr>
+            </a:outerShdw>
+          </a:effectLst>
+        </p:spPr>
+      </p:pic>
+    </p:spTree>
+    <p:extLst>
+      <p:ext uri="{BB962C8B-B14F-4D97-AF65-F5344CB8AC3E}">
+        <p14:creationId xmlns:p14="http://schemas.microsoft.com/office/powerpoint/2010/main" val="1064400146"/>
+      </p:ext>
+    </p:extLst>
+  </p:cSld>
+  <p:clrMapOvr>
+    <a:masterClrMapping/>
+  </p:clrMapOvr>
+</p:sld>
+</file>
+
+<file path=ppt/slides/slide5.xml><?xml version="1.0" encoding="utf-8"?>
+<p:sld xmlns:a="http://schemas.openxmlformats.org/drawingml/2006/main" xmlns:r="http://schemas.openxmlformats.org/officeDocument/2006/relationships" xmlns:p="http://schemas.openxmlformats.org/presentationml/2006/main">
+  <p:cSld>
+    <p:spTree>
+      <p:nvGrpSpPr>
+        <p:cNvPr id="1" name=""/>
+        <p:cNvGrpSpPr/>
+        <p:nvPr/>
+      </p:nvGrpSpPr>
+      <p:grpSpPr>
+        <a:xfrm>
+          <a:off x="0" y="0"/>
+          <a:ext cx="0" cy="0"/>
+          <a:chOff x="0" y="0"/>
+          <a:chExt cx="0" cy="0"/>
+        </a:xfrm>
+      </p:grpSpPr>
+      <p:sp>
+        <p:nvSpPr>
+          <p:cNvPr id="2" name="Title 1">
+            <a:extLst>
+              <a:ext uri="{FF2B5EF4-FFF2-40B4-BE49-F238E27FC236}">
+                <a16:creationId xmlns:a16="http://schemas.microsoft.com/office/drawing/2014/main" id="{9B6B83D1-416D-1070-0FA3-699191033F38}"/>
+              </a:ext>
+            </a:extLst>
+          </p:cNvPr>
+          <p:cNvSpPr>
+            <a:spLocks noGrp="1"/>
+          </p:cNvSpPr>
+          <p:nvPr>
+            <p:ph type="title"/>
+          </p:nvPr>
+        </p:nvSpPr>
+        <p:spPr>
+          <a:xfrm>
+            <a:off x="581193" y="729658"/>
+            <a:ext cx="11029616" cy="439385"/>
+          </a:xfrm>
+        </p:spPr>
+        <p:txBody>
+          <a:bodyPr>
+            <a:normAutofit fontScale="90000"/>
+          </a:bodyPr>
+          <a:lstStyle/>
+          <a:p>
+            <a:r>
+              <a:rPr lang="en-US" dirty="0"/>
+              <a:t>EDA: SPY500 Closing stock prices</a:t>
+            </a:r>
+          </a:p>
+        </p:txBody>
+      </p:sp>
+      <p:pic>
+        <p:nvPicPr>
+          <p:cNvPr id="5" name="Content Placeholder 4">
+            <a:extLst>
+              <a:ext uri="{FF2B5EF4-FFF2-40B4-BE49-F238E27FC236}">
+                <a16:creationId xmlns:a16="http://schemas.microsoft.com/office/drawing/2014/main" id="{53801A42-9254-C691-3219-7FBDB3DB8C7E}"/>
+              </a:ext>
+            </a:extLst>
+          </p:cNvPr>
+          <p:cNvPicPr>
+            <a:picLocks noGrp="1" noChangeAspect="1"/>
+          </p:cNvPicPr>
+          <p:nvPr>
+            <p:ph sz="half" idx="1"/>
+          </p:nvPr>
+        </p:nvPicPr>
+        <p:blipFill>
+          <a:blip r:embed="rId2"/>
+          <a:stretch>
+            <a:fillRect/>
+          </a:stretch>
+        </p:blipFill>
+        <p:spPr>
+          <a:xfrm>
+            <a:off x="210635" y="3709688"/>
+            <a:ext cx="5726025" cy="2620834"/>
+          </a:xfrm>
+          <a:prstGeom prst="rect">
+            <a:avLst/>
+          </a:prstGeom>
+          <a:ln>
+            <a:noFill/>
+          </a:ln>
+          <a:effectLst>
+            <a:outerShdw blurRad="292100" dist="139700" dir="2700000" algn="tl" rotWithShape="0">
+              <a:srgbClr val="333333">
+                <a:alpha val="65000"/>
+              </a:srgbClr>
+            </a:outerShdw>
+          </a:effectLst>
+        </p:spPr>
+      </p:pic>
+      <p:pic>
+        <p:nvPicPr>
+          <p:cNvPr id="6" name="Picture 5">
+            <a:extLst>
+              <a:ext uri="{FF2B5EF4-FFF2-40B4-BE49-F238E27FC236}">
+                <a16:creationId xmlns:a16="http://schemas.microsoft.com/office/drawing/2014/main" id="{94D742F6-3B8E-2AEB-B95F-194A18AA790D}"/>
+              </a:ext>
+            </a:extLst>
+          </p:cNvPr>
+          <p:cNvPicPr>
+            <a:picLocks noChangeAspect="1"/>
+          </p:cNvPicPr>
+          <p:nvPr/>
+        </p:nvPicPr>
+        <p:blipFill>
+          <a:blip r:embed="rId3"/>
+          <a:stretch>
+            <a:fillRect/>
+          </a:stretch>
+        </p:blipFill>
+        <p:spPr>
+          <a:xfrm>
+            <a:off x="6095999" y="3709687"/>
+            <a:ext cx="5767165" cy="2620834"/>
+          </a:xfrm>
+          <a:prstGeom prst="rect">
+            <a:avLst/>
+          </a:prstGeom>
+          <a:ln>
+            <a:noFill/>
+          </a:ln>
+          <a:effectLst>
+            <a:outerShdw blurRad="292100" dist="139700" dir="2700000" algn="tl" rotWithShape="0">
+              <a:srgbClr val="333333">
+                <a:alpha val="65000"/>
+              </a:srgbClr>
+            </a:outerShdw>
+          </a:effectLst>
+        </p:spPr>
+      </p:pic>
+      <p:pic>
+        <p:nvPicPr>
+          <p:cNvPr id="12" name="Content Placeholder 11">
+            <a:extLst>
+              <a:ext uri="{FF2B5EF4-FFF2-40B4-BE49-F238E27FC236}">
+                <a16:creationId xmlns:a16="http://schemas.microsoft.com/office/drawing/2014/main" id="{A509B785-74BC-C4DE-1FE0-3D981FAEA7EE}"/>
+              </a:ext>
+            </a:extLst>
+          </p:cNvPr>
+          <p:cNvPicPr>
+            <a:picLocks noGrp="1" noChangeAspect="1"/>
+          </p:cNvPicPr>
+          <p:nvPr>
+            <p:ph sz="half" idx="2"/>
+          </p:nvPr>
+        </p:nvPicPr>
+        <p:blipFill>
+          <a:blip r:embed="rId4"/>
+          <a:stretch>
+            <a:fillRect/>
+          </a:stretch>
+        </p:blipFill>
+        <p:spPr>
+          <a:xfrm>
+            <a:off x="3055035" y="1169043"/>
+            <a:ext cx="6081928" cy="2344914"/>
+          </a:xfrm>
+          <a:prstGeom prst="rect">
+            <a:avLst/>
+          </a:prstGeom>
+          <a:ln>
+            <a:noFill/>
+          </a:ln>
+          <a:effectLst>
+            <a:outerShdw blurRad="292100" dist="139700" dir="2700000" algn="tl" rotWithShape="0">
+              <a:srgbClr val="333333">
+                <a:alpha val="65000"/>
+              </a:srgbClr>
+            </a:outerShdw>
+          </a:effectLst>
+        </p:spPr>
+      </p:pic>
+    </p:spTree>
+    <p:extLst>
+      <p:ext uri="{BB962C8B-B14F-4D97-AF65-F5344CB8AC3E}">
+        <p14:creationId xmlns:p14="http://schemas.microsoft.com/office/powerpoint/2010/main" val="4111088995"/>
+      </p:ext>
+    </p:extLst>
+  </p:cSld>
+  <p:clrMapOvr>
+    <a:masterClrMapping/>
+  </p:clrMapOvr>
+</p:sld>
+</file>
+
+<file path=ppt/slides/slide6.xml><?xml version="1.0" encoding="utf-8"?>
+<p:sld xmlns:a="http://schemas.openxmlformats.org/drawingml/2006/main" xmlns:r="http://schemas.openxmlformats.org/officeDocument/2006/relationships" xmlns:p="http://schemas.openxmlformats.org/presentationml/2006/main">
+  <p:cSld>
+    <p:spTree>
+      <p:nvGrpSpPr>
+        <p:cNvPr id="1" name=""/>
+        <p:cNvGrpSpPr/>
+        <p:nvPr/>
+      </p:nvGrpSpPr>
+      <p:grpSpPr>
+        <a:xfrm>
+          <a:off x="0" y="0"/>
+          <a:ext cx="0" cy="0"/>
+          <a:chOff x="0" y="0"/>
+          <a:chExt cx="0" cy="0"/>
+        </a:xfrm>
+      </p:grpSpPr>
+      <p:sp>
+        <p:nvSpPr>
+          <p:cNvPr id="2" name="Title 1">
+            <a:extLst>
+              <a:ext uri="{FF2B5EF4-FFF2-40B4-BE49-F238E27FC236}">
+                <a16:creationId xmlns:a16="http://schemas.microsoft.com/office/drawing/2014/main" id="{9B6B83D1-416D-1070-0FA3-699191033F38}"/>
+              </a:ext>
+            </a:extLst>
+          </p:cNvPr>
+          <p:cNvSpPr>
+            <a:spLocks noGrp="1"/>
+          </p:cNvSpPr>
+          <p:nvPr>
+            <p:ph type="title"/>
+          </p:nvPr>
+        </p:nvSpPr>
+        <p:spPr/>
+        <p:txBody>
+          <a:bodyPr/>
+          <a:lstStyle/>
+          <a:p>
+            <a:r>
+              <a:rPr lang="en-US" dirty="0"/>
+              <a:t>EDA: Amazon Closing stock prices</a:t>
+            </a:r>
+          </a:p>
+        </p:txBody>
+      </p:sp>
+      <p:pic>
+        <p:nvPicPr>
+          <p:cNvPr id="5" name="Content Placeholder 4">
+            <a:extLst>
+              <a:ext uri="{FF2B5EF4-FFF2-40B4-BE49-F238E27FC236}">
+                <a16:creationId xmlns:a16="http://schemas.microsoft.com/office/drawing/2014/main" id="{55C8DA22-9874-692B-9D9F-96A86374B43C}"/>
+              </a:ext>
+            </a:extLst>
+          </p:cNvPr>
+          <p:cNvPicPr>
+            <a:picLocks noGrp="1" noChangeAspect="1"/>
+          </p:cNvPicPr>
+          <p:nvPr>
+            <p:ph sz="half" idx="1"/>
+          </p:nvPr>
+        </p:nvPicPr>
+        <p:blipFill>
+          <a:blip r:embed="rId2"/>
+          <a:stretch>
+            <a:fillRect/>
+          </a:stretch>
+        </p:blipFill>
+        <p:spPr>
+          <a:xfrm>
+            <a:off x="366292" y="2698487"/>
+            <a:ext cx="5729708" cy="3119288"/>
+          </a:xfrm>
+          <a:prstGeom prst="rect">
+            <a:avLst/>
+          </a:prstGeom>
+          <a:ln>
+            <a:noFill/>
+          </a:ln>
+          <a:effectLst>
+            <a:outerShdw blurRad="292100" dist="139700" dir="2700000" algn="tl" rotWithShape="0">
+              <a:srgbClr val="333333">
+                <a:alpha val="65000"/>
+              </a:srgbClr>
+            </a:outerShdw>
+          </a:effectLst>
+        </p:spPr>
+      </p:pic>
+      <p:pic>
+        <p:nvPicPr>
+          <p:cNvPr id="6" name="Content Placeholder 5">
+            <a:extLst>
+              <a:ext uri="{FF2B5EF4-FFF2-40B4-BE49-F238E27FC236}">
+                <a16:creationId xmlns:a16="http://schemas.microsoft.com/office/drawing/2014/main" id="{9E93AD6B-0726-FC4B-645F-C8B199EB05F6}"/>
+              </a:ext>
+            </a:extLst>
+          </p:cNvPr>
+          <p:cNvPicPr>
+            <a:picLocks noGrp="1" noChangeAspect="1"/>
+          </p:cNvPicPr>
+          <p:nvPr>
+            <p:ph sz="half" idx="2"/>
+          </p:nvPr>
+        </p:nvPicPr>
+        <p:blipFill>
+          <a:blip r:embed="rId3"/>
+          <a:stretch>
+            <a:fillRect/>
+          </a:stretch>
+        </p:blipFill>
+        <p:spPr>
+          <a:xfrm>
+            <a:off x="6208692" y="2245046"/>
+            <a:ext cx="5402117" cy="4026171"/>
+          </a:xfrm>
+          <a:prstGeom prst="rect">
+            <a:avLst/>
+          </a:prstGeom>
+          <a:ln>
+            <a:noFill/>
+          </a:ln>
+          <a:effectLst>
+            <a:outerShdw blurRad="292100" dist="139700" dir="2700000" algn="tl" rotWithShape="0">
+              <a:srgbClr val="333333">
+                <a:alpha val="65000"/>
+              </a:srgbClr>
+            </a:outerShdw>
+          </a:effectLst>
+        </p:spPr>
+      </p:pic>
+    </p:spTree>
+    <p:extLst>
+      <p:ext uri="{BB962C8B-B14F-4D97-AF65-F5344CB8AC3E}">
+        <p14:creationId xmlns:p14="http://schemas.microsoft.com/office/powerpoint/2010/main" val="2975561759"/>
+      </p:ext>
+    </p:extLst>
+  </p:cSld>
+  <p:clrMapOvr>
+    <a:masterClrMapping/>
+  </p:clrMapOvr>
+</p:sld>
+</file>
+
+<file path=ppt/slides/slide7.xml><?xml version="1.0" encoding="utf-8"?>
+<p:sld xmlns:a="http://schemas.openxmlformats.org/drawingml/2006/main" xmlns:r="http://schemas.openxmlformats.org/officeDocument/2006/relationships" xmlns:p="http://schemas.openxmlformats.org/presentationml/2006/main">
+  <p:cSld>
+    <p:spTree>
+      <p:nvGrpSpPr>
+        <p:cNvPr id="1" name=""/>
+        <p:cNvGrpSpPr/>
+        <p:nvPr/>
+      </p:nvGrpSpPr>
+      <p:grpSpPr>
+        <a:xfrm>
+          <a:off x="0" y="0"/>
+          <a:ext cx="0" cy="0"/>
+          <a:chOff x="0" y="0"/>
+          <a:chExt cx="0" cy="0"/>
+        </a:xfrm>
+      </p:grpSpPr>
+      <p:sp>
+        <p:nvSpPr>
+          <p:cNvPr id="2" name="Title 1">
+            <a:extLst>
+              <a:ext uri="{FF2B5EF4-FFF2-40B4-BE49-F238E27FC236}">
+                <a16:creationId xmlns:a16="http://schemas.microsoft.com/office/drawing/2014/main" id="{9B6B83D1-416D-1070-0FA3-699191033F38}"/>
+              </a:ext>
+            </a:extLst>
+          </p:cNvPr>
+          <p:cNvSpPr>
+            <a:spLocks noGrp="1"/>
+          </p:cNvSpPr>
+          <p:nvPr>
+            <p:ph type="title"/>
+          </p:nvPr>
+        </p:nvSpPr>
+        <p:spPr>
+          <a:xfrm>
+            <a:off x="581193" y="729658"/>
+            <a:ext cx="11029616" cy="462534"/>
+          </a:xfrm>
+        </p:spPr>
+        <p:txBody>
+          <a:bodyPr>
+            <a:normAutofit fontScale="90000"/>
+          </a:bodyPr>
+          <a:lstStyle/>
+          <a:p>
+            <a:r>
+              <a:rPr lang="en-US" dirty="0"/>
+              <a:t>EDA: Amazon Closing stock prices</a:t>
+            </a:r>
+          </a:p>
+        </p:txBody>
+      </p:sp>
+      <p:pic>
+        <p:nvPicPr>
+          <p:cNvPr id="10" name="Content Placeholder 9">
+            <a:extLst>
+              <a:ext uri="{FF2B5EF4-FFF2-40B4-BE49-F238E27FC236}">
+                <a16:creationId xmlns:a16="http://schemas.microsoft.com/office/drawing/2014/main" id="{9496F6FB-DD79-1CA3-9631-7201EFE81F96}"/>
+              </a:ext>
+            </a:extLst>
+          </p:cNvPr>
+          <p:cNvPicPr>
+            <a:picLocks noGrp="1" noChangeAspect="1"/>
+          </p:cNvPicPr>
+          <p:nvPr>
+            <p:ph sz="half" idx="2"/>
+          </p:nvPr>
+        </p:nvPicPr>
+        <p:blipFill>
+          <a:blip r:embed="rId2"/>
+          <a:stretch>
+            <a:fillRect/>
+          </a:stretch>
+        </p:blipFill>
+        <p:spPr>
+          <a:xfrm>
+            <a:off x="2494446" y="1276525"/>
+            <a:ext cx="7203101" cy="2357616"/>
+          </a:xfrm>
+          <a:prstGeom prst="rect">
+            <a:avLst/>
+          </a:prstGeom>
+          <a:ln>
+            <a:noFill/>
+          </a:ln>
+          <a:effectLst>
+            <a:outerShdw blurRad="292100" dist="139700" dir="2700000" algn="tl" rotWithShape="0">
+              <a:srgbClr val="333333">
+                <a:alpha val="65000"/>
+              </a:srgbClr>
+            </a:outerShdw>
+          </a:effectLst>
+        </p:spPr>
+      </p:pic>
+      <p:pic>
+        <p:nvPicPr>
+          <p:cNvPr id="11" name="Picture 10">
+            <a:extLst>
+              <a:ext uri="{FF2B5EF4-FFF2-40B4-BE49-F238E27FC236}">
+                <a16:creationId xmlns:a16="http://schemas.microsoft.com/office/drawing/2014/main" id="{3C3262C2-4E8F-0CB2-080A-016A35749239}"/>
+              </a:ext>
+            </a:extLst>
+          </p:cNvPr>
+          <p:cNvPicPr>
+            <a:picLocks noChangeAspect="1"/>
+          </p:cNvPicPr>
+          <p:nvPr/>
+        </p:nvPicPr>
+        <p:blipFill>
+          <a:blip r:embed="rId3"/>
+          <a:stretch>
+            <a:fillRect/>
+          </a:stretch>
+        </p:blipFill>
+        <p:spPr>
+          <a:xfrm>
+            <a:off x="6095997" y="3802284"/>
+            <a:ext cx="5760514" cy="2620835"/>
+          </a:xfrm>
+          <a:prstGeom prst="rect">
+            <a:avLst/>
+          </a:prstGeom>
+          <a:ln>
+            <a:noFill/>
+          </a:ln>
+          <a:effectLst>
+            <a:outerShdw blurRad="292100" dist="139700" dir="2700000" algn="tl" rotWithShape="0">
+              <a:srgbClr val="333333">
+                <a:alpha val="65000"/>
+              </a:srgbClr>
+            </a:outerShdw>
+          </a:effectLst>
+        </p:spPr>
+      </p:pic>
+      <p:pic>
+        <p:nvPicPr>
+          <p:cNvPr id="9" name="Content Placeholder 8">
+            <a:extLst>
+              <a:ext uri="{FF2B5EF4-FFF2-40B4-BE49-F238E27FC236}">
+                <a16:creationId xmlns:a16="http://schemas.microsoft.com/office/drawing/2014/main" id="{9BF4683E-E262-9559-5E0E-EE3392A6EE3D}"/>
+              </a:ext>
+            </a:extLst>
+          </p:cNvPr>
+          <p:cNvPicPr>
+            <a:picLocks noGrp="1" noChangeAspect="1"/>
+          </p:cNvPicPr>
+          <p:nvPr>
+            <p:ph sz="half" idx="1"/>
+          </p:nvPr>
+        </p:nvPicPr>
+        <p:blipFill>
+          <a:blip r:embed="rId4"/>
+          <a:stretch>
+            <a:fillRect/>
+          </a:stretch>
+        </p:blipFill>
+        <p:spPr>
+          <a:xfrm>
+            <a:off x="159985" y="3802285"/>
+            <a:ext cx="5667557" cy="2620835"/>
+          </a:xfrm>
+          <a:prstGeom prst="rect">
+            <a:avLst/>
+          </a:prstGeom>
+          <a:ln>
+            <a:noFill/>
+          </a:ln>
+          <a:effectLst>
+            <a:outerShdw blurRad="292100" dist="139700" dir="2700000" algn="tl" rotWithShape="0">
+              <a:srgbClr val="333333">
+                <a:alpha val="65000"/>
+              </a:srgbClr>
+            </a:outerShdw>
+          </a:effectLst>
+        </p:spPr>
+      </p:pic>
+    </p:spTree>
+    <p:extLst>
+      <p:ext uri="{BB962C8B-B14F-4D97-AF65-F5344CB8AC3E}">
+        <p14:creationId xmlns:p14="http://schemas.microsoft.com/office/powerpoint/2010/main" val="2730230440"/>
       </p:ext>
     </p:extLst>
   </p:cSld>

</xml_diff>